<commit_message>
Fixed missing image in pptx.
</commit_message>
<xml_diff>
--- a/Project_Quarto_R.pptx
+++ b/Project_Quarto_R.pptx
@@ -10,6 +10,7 @@
     <p:sldId id="258" r:id="rId4"/>
     <p:sldId id="259" r:id="rId5"/>
     <p:sldId id="260" r:id="rId6"/>
+    <p:sldId id="261" r:id="rId7"/>
   </p:sldIdLst>
   <p:sldSz cx="9144000" cy="5143500" type="screen16x9"/>
   <p:notesSz cx="6858000" cy="9144000"/>
@@ -3149,6 +3150,35 @@
             </a:pPr>
             <a:br/>
             <a:br/>
+            <a:r>
+              <a:rPr/>
+              <a:t>Student 296356</a:t>
+            </a:r>
+          </a:p>
+        </p:txBody>
+      </p:sp>
+      <p:sp>
+        <p:nvSpPr>
+          <p:cNvPr id="4" name="Date Placeholder 3"/>
+          <p:cNvSpPr>
+            <a:spLocks noGrp="1"/>
+          </p:cNvSpPr>
+          <p:nvPr>
+            <p:ph idx="10" sz="half" type="dt"/>
+          </p:nvPr>
+        </p:nvSpPr>
+        <p:spPr/>
+        <p:txBody>
+          <a:bodyPr/>
+          <a:lstStyle/>
+          <a:p>
+            <a:pPr lvl="0" indent="0" marL="0">
+              <a:buNone/>
+            </a:pPr>
+            <a:r>
+              <a:rPr/>
+              <a:t>2025-06-19</a:t>
+            </a:r>
           </a:p>
         </p:txBody>
       </p:sp>
@@ -3184,12 +3214,7 @@
             <p:ph type="title"/>
           </p:nvPr>
         </p:nvSpPr>
-        <p:spPr>
-          <a:xfrm>
-            <a:off x="457201" y="204787"/>
-            <a:ext cx="3008313" cy="871538"/>
-          </a:xfrm>
-        </p:spPr>
+        <p:spPr/>
         <p:txBody>
           <a:bodyPr/>
           <a:lstStyle/>
@@ -3199,129 +3224,86 @@
             </a:pPr>
             <a:r>
               <a:rPr/>
-              <a:t>Quarto project</a:t>
-            </a:r>
-          </a:p>
-        </p:txBody>
-      </p:sp>
-      <p:sp>
-        <p:nvSpPr>
-          <p:cNvPr id="4" name="Text Placeholder 3"/>
-          <p:cNvSpPr>
-            <a:spLocks noGrp="1"/>
-          </p:cNvSpPr>
-          <p:nvPr>
-            <p:ph idx="2" sz="half" type="body"/>
-          </p:nvPr>
-        </p:nvSpPr>
-        <p:spPr/>
-        <p:txBody>
-          <a:bodyPr/>
-          <a:lstStyle/>
-          <a:p>
-            <a:pPr lvl="0" indent="0" marL="0">
-              <a:buNone/>
-            </a:pPr>
-            <a:r>
-              <a:rPr/>
-              <a:t>Project title: Data analysis using R and Quarto</a:t>
-            </a:r>
-          </a:p>
-          <a:p>
-            <a:pPr lvl="0" indent="0" marL="0">
-              <a:buNone/>
-            </a:pPr>
-            <a:r>
-              <a:rPr/>
-              <a:t>Author: Student 296356</a:t>
-            </a:r>
-          </a:p>
-          <a:p>
-            <a:pPr lvl="0" indent="0" marL="0">
-              <a:buNone/>
-            </a:pPr>
-            <a:r>
-              <a:rPr/>
-              <a:t>Subject: Statistical analysis of Los Angeles crime reports</a:t>
-            </a:r>
-          </a:p>
-          <a:p>
-            <a:pPr lvl="0" indent="0" marL="0">
-              <a:buNone/>
-            </a:pPr>
-            <a:r>
-              <a:rPr/>
-              <a:t>Data source: Los Angeles crime types (based on 2024 data) (</a:t>
-            </a:r>
+              <a:t>Table of contents</a:t>
+            </a:r>
+          </a:p>
+        </p:txBody>
+      </p:sp>
+      <p:sp>
+        <p:nvSpPr>
+          <p:cNvPr id="3" name="Content Placeholder 2"/>
+          <p:cNvSpPr>
+            <a:spLocks noGrp="1"/>
+          </p:cNvSpPr>
+          <p:nvPr>
+            <p:ph idx="1"/>
+          </p:nvPr>
+        </p:nvSpPr>
+        <p:spPr/>
+        <p:txBody>
+          <a:bodyPr/>
+          <a:lstStyle/>
+          <a:p>
+            <a:pPr lvl="0"/>
             <a:r>
               <a:rPr>
-                <a:hlinkClick r:id="rId2"/>
+                <a:hlinkClick r:id="rId2" action="ppaction://hlinksldjump"/>
               </a:rPr>
-              <a:t>https://catalog.data.gov/dataset?tags=crime</a:t>
-            </a:r>
-            <a:r>
-              <a:rPr/>
-              <a:t>)</a:t>
-            </a:r>
-          </a:p>
-        </p:txBody>
-      </p:sp>
-      <p:pic>
-        <p:nvPicPr>
-          <p:cNvPr descr="Source_website.png" id="0" name="Picture 1"/>
-          <p:cNvPicPr>
-            <a:picLocks noGrp="1" noChangeAspect="1"/>
-          </p:cNvPicPr>
-          <p:nvPr/>
-        </p:nvPicPr>
-        <p:blipFill>
-          <a:blip r:embed="rId3"/>
-          <a:stretch>
-            <a:fillRect/>
-          </a:stretch>
-        </p:blipFill>
-        <p:spPr bwMode="auto">
-          <a:xfrm>
-            <a:off x="3873500" y="203200"/>
-            <a:ext cx="4508500" cy="3873500"/>
-          </a:xfrm>
-          <a:prstGeom prst="rect">
-            <a:avLst/>
-          </a:prstGeom>
-          <a:noFill/>
-          <a:ln w="9525">
-            <a:noFill/>
-            <a:headEnd/>
-            <a:tailEnd/>
-          </a:ln>
-        </p:spPr>
-      </p:pic>
-      <p:sp>
-        <p:nvSpPr>
-          <p:cNvPr id="1" name="TextBox 3"/>
-          <p:cNvSpPr txBox="1"/>
-          <p:nvPr/>
-        </p:nvSpPr>
-        <p:spPr>
-          <a:xfrm>
-            <a:off x="3568700" y="4076700"/>
-            <a:ext cx="5105400" cy="508000"/>
-          </a:xfrm>
-          <a:prstGeom prst="rect">
-            <a:avLst/>
-          </a:prstGeom>
-          <a:noFill/>
-        </p:spPr>
-        <p:txBody>
-          <a:bodyPr/>
-          <a:lstStyle/>
-          <a:p>
-            <a:pPr lvl="0" indent="0" marL="0" algn="ctr">
-              <a:buNone/>
-            </a:pPr>
-            <a:r>
-              <a:rPr/>
-              <a:t>Data source website</a:t>
+              <a:t>1. Quarto project</a:t>
+            </a:r>
+          </a:p>
+          <a:p>
+            <a:pPr lvl="0"/>
+            <a:r>
+              <a:rPr>
+                <a:hlinkClick r:id="rId3" action="ppaction://hlinksldjump"/>
+              </a:rPr>
+              <a:t>2. Most common crime types</a:t>
+            </a:r>
+          </a:p>
+          <a:p>
+            <a:pPr lvl="1"/>
+            <a:r>
+              <a:rPr>
+                <a:hlinkClick r:id="rId4" action="ppaction://hlinksldjump"/>
+              </a:rPr>
+              <a:t>2.1 Conclusion:</a:t>
+            </a:r>
+          </a:p>
+          <a:p>
+            <a:pPr lvl="0"/>
+            <a:r>
+              <a:rPr>
+                <a:hlinkClick r:id="rId5" action="ppaction://hlinksldjump"/>
+              </a:rPr>
+              <a:t>3. Geographical distribution of crime</a:t>
+            </a:r>
+          </a:p>
+          <a:p>
+            <a:pPr lvl="1"/>
+            <a:r>
+              <a:rPr>
+                <a:hlinkClick r:id="rId6" action="ppaction://hlinksldjump"/>
+              </a:rPr>
+              <a:t>3.1 Conclusion:</a:t>
+            </a:r>
+          </a:p>
+          <a:p>
+            <a:pPr lvl="0"/>
+            <a:r>
+              <a:rPr>
+                <a:hlinkClick r:id="rId7" action="ppaction://hlinksldjump"/>
+              </a:rPr>
+              <a:t>4. Crime distribution by area</a:t>
+            </a:r>
+          </a:p>
+          <a:p>
+            <a:pPr lvl="1"/>
+            <a:r>
+              <a:rPr>
+                <a:hlinkClick r:id="rId8" action="ppaction://hlinksldjump"/>
+              </a:rPr>
+              <a:t>4.1 Conclusion:</a:t>
             </a:r>
           </a:p>
         </p:txBody>
@@ -3373,7 +3355,7 @@
             </a:pPr>
             <a:r>
               <a:rPr/>
-              <a:t>Most common crime types</a:t>
+              <a:t>1. Quarto project</a:t>
             </a:r>
           </a:p>
         </p:txBody>
@@ -3398,7 +3380,7 @@
             </a:pPr>
             <a:r>
               <a:rPr/>
-              <a:t>The chart below shows an analysis of Los Angeles crime types in 2024 by frequency.</a:t>
+              <a:t>Project title: Data analysis using R and Quarto</a:t>
             </a:r>
           </a:p>
           <a:p>
@@ -3407,19 +3389,16 @@
             </a:pPr>
             <a:r>
               <a:rPr/>
-              <a:t>Twenty most common offences are presented.</a:t>
+              <a:t>Author: Student 296356</a:t>
             </a:r>
           </a:p>
           <a:p>
             <a:pPr lvl="0" indent="0" marL="0">
-              <a:spcBef>
-                <a:spcPts val="3000"/>
-              </a:spcBef>
               <a:buNone/>
             </a:pPr>
             <a:r>
-              <a:rPr b="1"/>
-              <a:t>Conclusion:</a:t>
+              <a:rPr/>
+              <a:t>Subject: Statistical analysis of Los Angeles crime reports</a:t>
             </a:r>
           </a:p>
           <a:p>
@@ -3428,21 +3407,31 @@
             </a:pPr>
             <a:r>
               <a:rPr/>
-              <a:t>The most common crime type in the LA area in 2004 was vehicle theft (an outstanding number of over 200,000 cases reported). The remaining types of offences are less variable in frequency, and none of them exceeded 100,000.</a:t>
+              <a:t>Data source: Los Angeles crime types (based on 2024 data) (</a:t>
+            </a:r>
+            <a:r>
+              <a:rPr>
+                <a:hlinkClick r:id="rId2"/>
+              </a:rPr>
+              <a:t>https://catalog.data.gov/dataset?tags=crime</a:t>
+            </a:r>
+            <a:r>
+              <a:rPr/>
+              <a:t>)</a:t>
             </a:r>
           </a:p>
         </p:txBody>
       </p:sp>
       <p:pic>
         <p:nvPicPr>
-          <p:cNvPr descr="Project_Quarto_R_files/figure-pptx/plot-frequency-1.png" id="0" name="Picture 1"/>
+          <p:cNvPr descr="Source_website.png" id="0" name="Picture 1"/>
           <p:cNvPicPr>
             <a:picLocks noGrp="1" noChangeAspect="1"/>
           </p:cNvPicPr>
           <p:nvPr/>
         </p:nvPicPr>
         <p:blipFill>
-          <a:blip r:embed="rId2"/>
+          <a:blip r:embed="rId3"/>
           <a:stretch>
             <a:fillRect/>
           </a:stretch>
@@ -3450,7 +3439,7 @@
         <p:spPr bwMode="auto">
           <a:xfrm>
             <a:off x="3568700" y="203200"/>
-            <a:ext cx="5105400" cy="4381500"/>
+            <a:ext cx="5092700" cy="4381500"/>
           </a:xfrm>
           <a:prstGeom prst="rect">
             <a:avLst/>
@@ -3510,7 +3499,7 @@
             </a:pPr>
             <a:r>
               <a:rPr/>
-              <a:t>Geographical distribution of crime</a:t>
+              <a:t>2. Most common crime types</a:t>
             </a:r>
           </a:p>
         </p:txBody>
@@ -3535,7 +3524,16 @@
             </a:pPr>
             <a:r>
               <a:rPr/>
-              <a:t>Certain offences usually exhibit a heterogeneous geographical distribution. To illustrate this, the map below displays the locations of reported cases of physical assault involving minors in 2024. Colors indicate victim sex.</a:t>
+              <a:t>The chart below shows an analysis of Los Angeles crime types in 2024 by frequency.</a:t>
+            </a:r>
+          </a:p>
+          <a:p>
+            <a:pPr lvl="0" indent="0" marL="0">
+              <a:buNone/>
+            </a:pPr>
+            <a:r>
+              <a:rPr/>
+              <a:t>Twenty most common offences are presented.</a:t>
             </a:r>
           </a:p>
           <a:p>
@@ -3547,7 +3545,7 @@
             </a:pPr>
             <a:r>
               <a:rPr b="1"/>
-              <a:t>Conclusion:</a:t>
+              <a:t>2.1 Conclusion:</a:t>
             </a:r>
           </a:p>
           <a:p>
@@ -3556,14 +3554,14 @@
             </a:pPr>
             <a:r>
               <a:rPr/>
-              <a:t>The map clearly shows two clusters corresponding to areas where the majority of these offences (assaults on minors) occur, indicating where preventive measures in this regard should be intensified. No clear pattern is evident regarding the victims’ sex.</a:t>
+              <a:t>The most common crime type in the LA area in 2004 was vehicle theft (an outstanding number of over 200,000 cases reported). The remaining types of offences are less variable in frequency, and none of them exceeded 100,000.</a:t>
             </a:r>
           </a:p>
         </p:txBody>
       </p:sp>
       <p:pic>
         <p:nvPicPr>
-          <p:cNvPr descr="Project_Quarto_R_files/figure-pptx/plot-map-1.png" id="0" name="Picture 1"/>
+          <p:cNvPr descr="Project_Quarto_R_files/figure-pptx/plot-frequency-1.png" id="0" name="Picture 1"/>
           <p:cNvPicPr>
             <a:picLocks noGrp="1" noChangeAspect="1"/>
           </p:cNvPicPr>
@@ -3638,7 +3636,7 @@
             </a:pPr>
             <a:r>
               <a:rPr/>
-              <a:t>Crime distribution by area</a:t>
+              <a:t>3. Geographical distribution of crime</a:t>
             </a:r>
           </a:p>
         </p:txBody>
@@ -3663,16 +3661,7 @@
             </a:pPr>
             <a:r>
               <a:rPr/>
-              <a:t>The chart below shows crime distribution in the LA region by area.</a:t>
-            </a:r>
-          </a:p>
-          <a:p>
-            <a:pPr lvl="0" indent="0" marL="0">
-              <a:buNone/>
-            </a:pPr>
-            <a:r>
-              <a:rPr/>
-              <a:t>Five most common offences are presented.</a:t>
+              <a:t>Certain offences usually exhibit a heterogeneous geographical distribution. To illustrate this, the map below displays the locations of reported cases of physical assault involving minors in 2024. Colors indicate victim sex.</a:t>
             </a:r>
           </a:p>
           <a:p>
@@ -3684,7 +3673,144 @@
             </a:pPr>
             <a:r>
               <a:rPr b="1"/>
-              <a:t>Conclusion:</a:t>
+              <a:t>3.1 Conclusion:</a:t>
+            </a:r>
+          </a:p>
+          <a:p>
+            <a:pPr lvl="0" indent="0" marL="0">
+              <a:buNone/>
+            </a:pPr>
+            <a:r>
+              <a:rPr/>
+              <a:t>The map clearly shows two clusters corresponding to areas where the majority of these offences (assaults on minors) occur, indicating where preventive measures in this regard should be intensified. No clear pattern is evident regarding the victims’ sex.</a:t>
+            </a:r>
+          </a:p>
+        </p:txBody>
+      </p:sp>
+      <p:pic>
+        <p:nvPicPr>
+          <p:cNvPr descr="Project_Quarto_R_files/figure-pptx/plot-map-1.png" id="0" name="Picture 1"/>
+          <p:cNvPicPr>
+            <a:picLocks noGrp="1" noChangeAspect="1"/>
+          </p:cNvPicPr>
+          <p:nvPr/>
+        </p:nvPicPr>
+        <p:blipFill>
+          <a:blip r:embed="rId2"/>
+          <a:stretch>
+            <a:fillRect/>
+          </a:stretch>
+        </p:blipFill>
+        <p:spPr bwMode="auto">
+          <a:xfrm>
+            <a:off x="3568700" y="1117600"/>
+            <a:ext cx="5105400" cy="2552700"/>
+          </a:xfrm>
+          <a:prstGeom prst="rect">
+            <a:avLst/>
+          </a:prstGeom>
+          <a:noFill/>
+          <a:ln w="9525">
+            <a:noFill/>
+            <a:headEnd/>
+            <a:tailEnd/>
+          </a:ln>
+        </p:spPr>
+      </p:pic>
+    </p:spTree>
+  </p:cSld>
+</p:sld>
+</file>
+
+<file path=ppt/slides/slide6.xml><?xml version="1.0" encoding="utf-8"?>
+<p:sld xmlns:a="http://schemas.openxmlformats.org/drawingml/2006/main" xmlns:r="http://schemas.openxmlformats.org/officeDocument/2006/relationships" xmlns:p="http://schemas.openxmlformats.org/presentationml/2006/main">
+  <p:cSld>
+    <p:spTree>
+      <p:nvGrpSpPr>
+        <p:cNvPr id="1" name=""/>
+        <p:cNvGrpSpPr/>
+        <p:nvPr/>
+      </p:nvGrpSpPr>
+      <p:grpSpPr>
+        <a:xfrm>
+          <a:off x="0" y="0"/>
+          <a:ext cx="0" cy="0"/>
+          <a:chOff x="0" y="0"/>
+          <a:chExt cx="0" cy="0"/>
+        </a:xfrm>
+      </p:grpSpPr>
+      <p:sp>
+        <p:nvSpPr>
+          <p:cNvPr id="2" name="Title 1"/>
+          <p:cNvSpPr>
+            <a:spLocks noGrp="1"/>
+          </p:cNvSpPr>
+          <p:nvPr>
+            <p:ph type="title"/>
+          </p:nvPr>
+        </p:nvSpPr>
+        <p:spPr>
+          <a:xfrm>
+            <a:off x="457201" y="204787"/>
+            <a:ext cx="3008313" cy="871538"/>
+          </a:xfrm>
+        </p:spPr>
+        <p:txBody>
+          <a:bodyPr/>
+          <a:lstStyle/>
+          <a:p>
+            <a:pPr lvl="0" indent="0" marL="0">
+              <a:buNone/>
+            </a:pPr>
+            <a:r>
+              <a:rPr/>
+              <a:t>4. Crime distribution by area</a:t>
+            </a:r>
+          </a:p>
+        </p:txBody>
+      </p:sp>
+      <p:sp>
+        <p:nvSpPr>
+          <p:cNvPr id="4" name="Text Placeholder 3"/>
+          <p:cNvSpPr>
+            <a:spLocks noGrp="1"/>
+          </p:cNvSpPr>
+          <p:nvPr>
+            <p:ph idx="2" sz="half" type="body"/>
+          </p:nvPr>
+        </p:nvSpPr>
+        <p:spPr/>
+        <p:txBody>
+          <a:bodyPr/>
+          <a:lstStyle/>
+          <a:p>
+            <a:pPr lvl="0" indent="0" marL="0">
+              <a:buNone/>
+            </a:pPr>
+            <a:r>
+              <a:rPr/>
+              <a:t>The chart below shows crime distribution in the LA region by area.</a:t>
+            </a:r>
+          </a:p>
+          <a:p>
+            <a:pPr lvl="0" indent="0" marL="0">
+              <a:buNone/>
+            </a:pPr>
+            <a:r>
+              <a:rPr/>
+              <a:t>Five most common offences are presented.</a:t>
+            </a:r>
+          </a:p>
+          <a:p>
+            <a:pPr lvl="0" indent="0" marL="0">
+              <a:spcBef>
+                <a:spcPts val="3000"/>
+              </a:spcBef>
+              <a:buNone/>
+            </a:pPr>
+            <a:r>
+              <a:rPr b="1"/>
+              <a:t>4.1 Conclusion:</a:t>
             </a:r>
           </a:p>
           <a:p>

</xml_diff>

<commit_message>
Fixed page break before chart in pdf.
</commit_message>
<xml_diff>
--- a/Project_Quarto_R.pptx
+++ b/Project_Quarto_R.pptx
@@ -3262,12 +3262,12 @@
             </a:r>
           </a:p>
           <a:p>
-            <a:pPr lvl="1"/>
+            <a:pPr lvl="0"/>
             <a:r>
               <a:rPr>
                 <a:hlinkClick r:id="rId4" action="ppaction://hlinksldjump"/>
               </a:rPr>
-              <a:t>2.1 Conclusion:</a:t>
+              <a:t>3. Geographical distribution of crime</a:t>
             </a:r>
           </a:p>
           <a:p>
@@ -3276,34 +3276,7 @@
               <a:rPr>
                 <a:hlinkClick r:id="rId5" action="ppaction://hlinksldjump"/>
               </a:rPr>
-              <a:t>3. Geographical distribution of crime</a:t>
-            </a:r>
-          </a:p>
-          <a:p>
-            <a:pPr lvl="1"/>
-            <a:r>
-              <a:rPr>
-                <a:hlinkClick r:id="rId6" action="ppaction://hlinksldjump"/>
-              </a:rPr>
-              <a:t>3.1 Conclusion:</a:t>
-            </a:r>
-          </a:p>
-          <a:p>
-            <a:pPr lvl="0"/>
-            <a:r>
-              <a:rPr>
-                <a:hlinkClick r:id="rId7" action="ppaction://hlinksldjump"/>
-              </a:rPr>
               <a:t>4. Crime distribution by area</a:t>
-            </a:r>
-          </a:p>
-          <a:p>
-            <a:pPr lvl="1"/>
-            <a:r>
-              <a:rPr>
-                <a:hlinkClick r:id="rId8" action="ppaction://hlinksldjump"/>
-              </a:rPr>
-              <a:t>4.1 Conclusion:</a:t>
             </a:r>
           </a:p>
         </p:txBody>
@@ -3545,7 +3518,7 @@
             </a:pPr>
             <a:r>
               <a:rPr b="1"/>
-              <a:t>2.1 Conclusion:</a:t>
+              <a:t>Conclusion:</a:t>
             </a:r>
           </a:p>
           <a:p>
@@ -3556,6 +3529,12 @@
               <a:rPr/>
               <a:t>The most common crime type in the LA area in 2004 was vehicle theft (an outstanding number of over 200,000 cases reported). The remaining types of offences are less variable in frequency, and none of them exceeded 100,000.</a:t>
             </a:r>
+          </a:p>
+          <a:p>
+            <a:pPr lvl="0" indent="0" marL="0">
+              <a:buNone/>
+            </a:pPr>
+            <a:br/>
           </a:p>
         </p:txBody>
       </p:sp>
@@ -3673,7 +3652,7 @@
             </a:pPr>
             <a:r>
               <a:rPr b="1"/>
-              <a:t>3.1 Conclusion:</a:t>
+              <a:t>Conclusion:</a:t>
             </a:r>
           </a:p>
           <a:p>
@@ -3682,8 +3661,23 @@
             </a:pPr>
             <a:r>
               <a:rPr/>
-              <a:t>The map clearly shows two clusters corresponding to areas where the majority of these offences (assaults on minors) occur, indicating where preventive measures in this regard should be intensified. No clear pattern is evident regarding the victims’ sex.</a:t>
-            </a:r>
+              <a:t>The map clearly shows two clusters corresponding to areas where the majority of these offences (assaults on minors) occur, indicating where preventive measures in this regard should be intensified.</a:t>
+            </a:r>
+          </a:p>
+          <a:p>
+            <a:pPr lvl="0" indent="0" marL="0">
+              <a:buNone/>
+            </a:pPr>
+            <a:r>
+              <a:rPr/>
+              <a:t>No clear pattern is evident regarding the victims’ sex.</a:t>
+            </a:r>
+          </a:p>
+          <a:p>
+            <a:pPr lvl="0" indent="0" marL="0">
+              <a:buNone/>
+            </a:pPr>
+            <a:br/>
           </a:p>
         </p:txBody>
       </p:sp>
@@ -3789,16 +3783,7 @@
             </a:pPr>
             <a:r>
               <a:rPr/>
-              <a:t>The chart below shows crime distribution in the LA region by area.</a:t>
-            </a:r>
-          </a:p>
-          <a:p>
-            <a:pPr lvl="0" indent="0" marL="0">
-              <a:buNone/>
-            </a:pPr>
-            <a:r>
-              <a:rPr/>
-              <a:t>Five most common offences are presented.</a:t>
+              <a:t>The chart below shows crime distribution in the LA region by area. Five most common offences are presented.</a:t>
             </a:r>
           </a:p>
           <a:p>
@@ -3810,7 +3795,7 @@
             </a:pPr>
             <a:r>
               <a:rPr b="1"/>
-              <a:t>4.1 Conclusion:</a:t>
+              <a:t>Conclusion:</a:t>
             </a:r>
           </a:p>
           <a:p>

</xml_diff>

<commit_message>
Added heatmap of crime vs time of day.
</commit_message>
<xml_diff>
--- a/Project_Quarto_R.pptx
+++ b/Project_Quarto_R.pptx
@@ -3411,8 +3411,8 @@
         </p:blipFill>
         <p:spPr bwMode="auto">
           <a:xfrm>
-            <a:off x="3568700" y="203200"/>
-            <a:ext cx="5092700" cy="4381500"/>
+            <a:off x="3568700" y="355600"/>
+            <a:ext cx="5105400" cy="4076700"/>
           </a:xfrm>
           <a:prstGeom prst="rect">
             <a:avLst/>

</xml_diff>

<commit_message>
Final corrections of formatting, layout and conclusions.
</commit_message>
<xml_diff>
--- a/Project_Quarto_R.pptx
+++ b/Project_Quarto_R.pptx
@@ -15,6 +15,7 @@
     <p:sldId id="263" r:id="rId9"/>
     <p:sldId id="264" r:id="rId10"/>
     <p:sldId id="265" r:id="rId11"/>
+    <p:sldId id="266" r:id="rId12"/>
   </p:sldIdLst>
   <p:sldSz cx="9144000" cy="5143500" type="screen16x9"/>
   <p:notesSz cx="6858000" cy="9144000"/>
@@ -311,7 +312,7 @@
           <a:p>
             <a:fld id="{241EB5C9-1307-BA42-ABA2-0BC069CD8E7F}" type="datetimeFigureOut">
               <a:rPr lang="en-US" smtClean="0"/>
-              <a:t>1/2/22</a:t>
+              <a:t>6/21/2025</a:t>
             </a:fld>
             <a:endParaRPr lang="en-US"/>
           </a:p>
@@ -479,7 +480,7 @@
           <a:p>
             <a:fld id="{241EB5C9-1307-BA42-ABA2-0BC069CD8E7F}" type="datetimeFigureOut">
               <a:rPr lang="en-US" smtClean="0"/>
-              <a:t>1/2/22</a:t>
+              <a:t>6/21/2025</a:t>
             </a:fld>
             <a:endParaRPr lang="en-US"/>
           </a:p>
@@ -657,7 +658,7 @@
           <a:p>
             <a:fld id="{241EB5C9-1307-BA42-ABA2-0BC069CD8E7F}" type="datetimeFigureOut">
               <a:rPr lang="en-US" smtClean="0"/>
-              <a:t>1/2/22</a:t>
+              <a:t>6/21/2025</a:t>
             </a:fld>
             <a:endParaRPr lang="en-US"/>
           </a:p>
@@ -770,39 +771,43 @@
         <p:spPr/>
         <p:txBody>
           <a:bodyPr/>
-          <a:lstStyle/>
+          <a:lstStyle>
+            <a:lvl1pPr>
+              <a:defRPr sz="1050"/>
+            </a:lvl1pPr>
+          </a:lstStyle>
           <a:p>
             <a:pPr lvl="0"/>
             <a:r>
-              <a:rPr lang="en-US"/>
+              <a:rPr lang="en-US" dirty="0"/>
               <a:t>Click to edit Master text styles</a:t>
             </a:r>
           </a:p>
           <a:p>
             <a:pPr lvl="1"/>
             <a:r>
-              <a:rPr lang="en-US"/>
+              <a:rPr lang="en-US" dirty="0"/>
               <a:t>Second level</a:t>
             </a:r>
           </a:p>
           <a:p>
             <a:pPr lvl="2"/>
             <a:r>
-              <a:rPr lang="en-US"/>
+              <a:rPr lang="en-US" dirty="0"/>
               <a:t>Third level</a:t>
             </a:r>
           </a:p>
           <a:p>
             <a:pPr lvl="3"/>
             <a:r>
-              <a:rPr lang="en-US"/>
+              <a:rPr lang="en-US" dirty="0"/>
               <a:t>Fourth level</a:t>
             </a:r>
           </a:p>
           <a:p>
             <a:pPr lvl="4"/>
             <a:r>
-              <a:rPr lang="en-US"/>
+              <a:rPr lang="en-US" dirty="0"/>
               <a:t>Fifth level</a:t>
             </a:r>
           </a:p>
@@ -825,7 +830,7 @@
           <a:p>
             <a:fld id="{241EB5C9-1307-BA42-ABA2-0BC069CD8E7F}" type="datetimeFigureOut">
               <a:rPr lang="en-US" smtClean="0"/>
-              <a:t>1/2/22</a:t>
+              <a:t>6/21/2025</a:t>
             </a:fld>
             <a:endParaRPr lang="en-US"/>
           </a:p>
@@ -1070,7 +1075,7 @@
           <a:p>
             <a:fld id="{241EB5C9-1307-BA42-ABA2-0BC069CD8E7F}" type="datetimeFigureOut">
               <a:rPr lang="en-US" smtClean="0"/>
-              <a:t>1/2/22</a:t>
+              <a:t>6/21/2025</a:t>
             </a:fld>
             <a:endParaRPr lang="en-US"/>
           </a:p>
@@ -1355,7 +1360,7 @@
           <a:p>
             <a:fld id="{241EB5C9-1307-BA42-ABA2-0BC069CD8E7F}" type="datetimeFigureOut">
               <a:rPr lang="en-US" smtClean="0"/>
-              <a:t>1/2/22</a:t>
+              <a:t>6/21/2025</a:t>
             </a:fld>
             <a:endParaRPr lang="en-US"/>
           </a:p>
@@ -1466,7 +1471,7 @@
             <a:spLocks noGrp="1"/>
           </p:cNvSpPr>
           <p:nvPr>
-            <p:ph type="body" idx="1"/>
+            <p:ph type="body" idx="1" hasCustomPrompt="1"/>
           </p:nvPr>
         </p:nvSpPr>
         <p:spPr>
@@ -1476,11 +1481,13 @@
           </a:xfrm>
         </p:spPr>
         <p:txBody>
-          <a:bodyPr anchor="b"/>
+          <a:bodyPr anchor="t">
+            <a:normAutofit/>
+          </a:bodyPr>
           <a:lstStyle>
             <a:lvl1pPr marL="0" indent="0">
               <a:buNone/>
-              <a:defRPr sz="1800" b="1"/>
+              <a:defRPr sz="1400" b="1"/>
             </a:lvl1pPr>
             <a:lvl2pPr marL="342900" indent="0">
               <a:buNone/>
@@ -1518,7 +1525,7 @@
           <a:p>
             <a:pPr lvl="0"/>
             <a:r>
-              <a:rPr lang="en-US"/>
+              <a:rPr lang="en-US" dirty="0"/>
               <a:t>Click to edit Master text styles</a:t>
             </a:r>
           </a:p>
@@ -1537,7 +1544,7 @@
         <p:spPr>
           <a:xfrm>
             <a:off x="457200" y="1631156"/>
-            <a:ext cx="4040188" cy="2963466"/>
+            <a:ext cx="4040188" cy="1845212"/>
           </a:xfrm>
         </p:spPr>
         <p:txBody>
@@ -1574,35 +1581,35 @@
           <a:p>
             <a:pPr lvl="0"/>
             <a:r>
-              <a:rPr lang="en-US"/>
+              <a:rPr lang="en-US" dirty="0"/>
               <a:t>Click to edit Master text styles</a:t>
             </a:r>
           </a:p>
           <a:p>
             <a:pPr lvl="1"/>
             <a:r>
-              <a:rPr lang="en-US"/>
+              <a:rPr lang="en-US" dirty="0"/>
               <a:t>Second level</a:t>
             </a:r>
           </a:p>
           <a:p>
             <a:pPr lvl="2"/>
             <a:r>
-              <a:rPr lang="en-US"/>
+              <a:rPr lang="en-US" dirty="0"/>
               <a:t>Third level</a:t>
             </a:r>
           </a:p>
           <a:p>
             <a:pPr lvl="3"/>
             <a:r>
-              <a:rPr lang="en-US"/>
+              <a:rPr lang="en-US" dirty="0"/>
               <a:t>Fourth level</a:t>
             </a:r>
           </a:p>
           <a:p>
             <a:pPr lvl="4"/>
             <a:r>
-              <a:rPr lang="en-US"/>
+              <a:rPr lang="en-US" dirty="0"/>
               <a:t>Fifth level</a:t>
             </a:r>
           </a:p>
@@ -1615,7 +1622,7 @@
             <a:spLocks noGrp="1"/>
           </p:cNvSpPr>
           <p:nvPr>
-            <p:ph type="body" sz="quarter" idx="3"/>
+            <p:ph type="body" sz="quarter" idx="3" hasCustomPrompt="1"/>
           </p:nvPr>
         </p:nvSpPr>
         <p:spPr>
@@ -1625,11 +1632,13 @@
           </a:xfrm>
         </p:spPr>
         <p:txBody>
-          <a:bodyPr anchor="b"/>
+          <a:bodyPr anchor="t">
+            <a:normAutofit/>
+          </a:bodyPr>
           <a:lstStyle>
             <a:lvl1pPr marL="0" indent="0">
               <a:buNone/>
-              <a:defRPr sz="1800" b="1"/>
+              <a:defRPr sz="1400" b="1"/>
             </a:lvl1pPr>
             <a:lvl2pPr marL="342900" indent="0">
               <a:buNone/>
@@ -1667,7 +1676,7 @@
           <a:p>
             <a:pPr lvl="0"/>
             <a:r>
-              <a:rPr lang="en-US"/>
+              <a:rPr lang="en-US" dirty="0"/>
               <a:t>Click to edit Master text styles</a:t>
             </a:r>
           </a:p>
@@ -1686,7 +1695,7 @@
         <p:spPr>
           <a:xfrm>
             <a:off x="4645026" y="1631156"/>
-            <a:ext cx="4041775" cy="2963466"/>
+            <a:ext cx="4041775" cy="1845212"/>
           </a:xfrm>
         </p:spPr>
         <p:txBody>
@@ -1774,7 +1783,7 @@
           <a:p>
             <a:fld id="{241EB5C9-1307-BA42-ABA2-0BC069CD8E7F}" type="datetimeFigureOut">
               <a:rPr lang="en-US" smtClean="0"/>
-              <a:t>1/2/22</a:t>
+              <a:t>6/21/2025</a:t>
             </a:fld>
             <a:endParaRPr lang="en-US"/>
           </a:p>
@@ -1819,6 +1828,152 @@
               <a:t>‹#›</a:t>
             </a:fld>
             <a:endParaRPr lang="en-US"/>
+          </a:p>
+        </p:txBody>
+      </p:sp>
+      <p:sp>
+        <p:nvSpPr>
+          <p:cNvPr id="10" name="Text Placeholder 2">
+            <a:extLst>
+              <a:ext uri="{FF2B5EF4-FFF2-40B4-BE49-F238E27FC236}">
+                <a16:creationId xmlns:a16="http://schemas.microsoft.com/office/drawing/2014/main" id="{B9875CDC-15BE-7E1E-A387-15BE6F031D1C}"/>
+              </a:ext>
+            </a:extLst>
+          </p:cNvPr>
+          <p:cNvSpPr>
+            <a:spLocks noGrp="1"/>
+          </p:cNvSpPr>
+          <p:nvPr>
+            <p:ph type="body" idx="13" hasCustomPrompt="1"/>
+          </p:nvPr>
+        </p:nvSpPr>
+        <p:spPr>
+          <a:xfrm>
+            <a:off x="457199" y="3518618"/>
+            <a:ext cx="4040188" cy="1098689"/>
+          </a:xfrm>
+        </p:spPr>
+        <p:txBody>
+          <a:bodyPr anchor="t">
+            <a:normAutofit/>
+          </a:bodyPr>
+          <a:lstStyle>
+            <a:lvl1pPr marL="0" indent="0">
+              <a:buNone/>
+              <a:defRPr sz="1400" b="1"/>
+            </a:lvl1pPr>
+            <a:lvl2pPr marL="342900" indent="0">
+              <a:buNone/>
+              <a:defRPr sz="1500" b="1"/>
+            </a:lvl2pPr>
+            <a:lvl3pPr marL="685800" indent="0">
+              <a:buNone/>
+              <a:defRPr sz="1350" b="1"/>
+            </a:lvl3pPr>
+            <a:lvl4pPr marL="1028700" indent="0">
+              <a:buNone/>
+              <a:defRPr sz="1200" b="1"/>
+            </a:lvl4pPr>
+            <a:lvl5pPr marL="1371600" indent="0">
+              <a:buNone/>
+              <a:defRPr sz="1200" b="1"/>
+            </a:lvl5pPr>
+            <a:lvl6pPr marL="1714500" indent="0">
+              <a:buNone/>
+              <a:defRPr sz="1200" b="1"/>
+            </a:lvl6pPr>
+            <a:lvl7pPr marL="2057400" indent="0">
+              <a:buNone/>
+              <a:defRPr sz="1200" b="1"/>
+            </a:lvl7pPr>
+            <a:lvl8pPr marL="2400300" indent="0">
+              <a:buNone/>
+              <a:defRPr sz="1200" b="1"/>
+            </a:lvl8pPr>
+            <a:lvl9pPr marL="2743200" indent="0">
+              <a:buNone/>
+              <a:defRPr sz="1200" b="1"/>
+            </a:lvl9pPr>
+          </a:lstStyle>
+          <a:p>
+            <a:pPr lvl="0"/>
+            <a:r>
+              <a:rPr lang="en-US" dirty="0"/>
+              <a:t>Click to edit Master text styles</a:t>
+            </a:r>
+          </a:p>
+        </p:txBody>
+      </p:sp>
+      <p:sp>
+        <p:nvSpPr>
+          <p:cNvPr id="11" name="Text Placeholder 4">
+            <a:extLst>
+              <a:ext uri="{FF2B5EF4-FFF2-40B4-BE49-F238E27FC236}">
+                <a16:creationId xmlns:a16="http://schemas.microsoft.com/office/drawing/2014/main" id="{04AFDF04-24A0-CDD5-85F7-FAEFB6BBEC67}"/>
+              </a:ext>
+            </a:extLst>
+          </p:cNvPr>
+          <p:cNvSpPr>
+            <a:spLocks noGrp="1"/>
+          </p:cNvSpPr>
+          <p:nvPr>
+            <p:ph type="body" sz="quarter" idx="14" hasCustomPrompt="1"/>
+          </p:nvPr>
+        </p:nvSpPr>
+        <p:spPr>
+          <a:xfrm>
+            <a:off x="4645025" y="3518618"/>
+            <a:ext cx="4041775" cy="1098689"/>
+          </a:xfrm>
+        </p:spPr>
+        <p:txBody>
+          <a:bodyPr anchor="t">
+            <a:normAutofit/>
+          </a:bodyPr>
+          <a:lstStyle>
+            <a:lvl1pPr marL="0" indent="0">
+              <a:buNone/>
+              <a:defRPr sz="1400" b="1"/>
+            </a:lvl1pPr>
+            <a:lvl2pPr marL="342900" indent="0">
+              <a:buNone/>
+              <a:defRPr sz="1500" b="1"/>
+            </a:lvl2pPr>
+            <a:lvl3pPr marL="685800" indent="0">
+              <a:buNone/>
+              <a:defRPr sz="1350" b="1"/>
+            </a:lvl3pPr>
+            <a:lvl4pPr marL="1028700" indent="0">
+              <a:buNone/>
+              <a:defRPr sz="1200" b="1"/>
+            </a:lvl4pPr>
+            <a:lvl5pPr marL="1371600" indent="0">
+              <a:buNone/>
+              <a:defRPr sz="1200" b="1"/>
+            </a:lvl5pPr>
+            <a:lvl6pPr marL="1714500" indent="0">
+              <a:buNone/>
+              <a:defRPr sz="1200" b="1"/>
+            </a:lvl6pPr>
+            <a:lvl7pPr marL="2057400" indent="0">
+              <a:buNone/>
+              <a:defRPr sz="1200" b="1"/>
+            </a:lvl7pPr>
+            <a:lvl8pPr marL="2400300" indent="0">
+              <a:buNone/>
+              <a:defRPr sz="1200" b="1"/>
+            </a:lvl8pPr>
+            <a:lvl9pPr marL="2743200" indent="0">
+              <a:buNone/>
+              <a:defRPr sz="1200" b="1"/>
+            </a:lvl9pPr>
+          </a:lstStyle>
+          <a:p>
+            <a:pPr lvl="0"/>
+            <a:r>
+              <a:rPr lang="en-US"/>
+              <a:t>Click to edit Master text styles</a:t>
+            </a:r>
           </a:p>
         </p:txBody>
       </p:sp>
@@ -1891,7 +2046,7 @@
           <a:p>
             <a:fld id="{241EB5C9-1307-BA42-ABA2-0BC069CD8E7F}" type="datetimeFigureOut">
               <a:rPr lang="en-US" smtClean="0"/>
-              <a:t>1/2/22</a:t>
+              <a:t>6/21/2025</a:t>
             </a:fld>
             <a:endParaRPr lang="en-US"/>
           </a:p>
@@ -1986,7 +2141,7 @@
           <a:p>
             <a:fld id="{241EB5C9-1307-BA42-ABA2-0BC069CD8E7F}" type="datetimeFigureOut">
               <a:rPr lang="en-US" smtClean="0"/>
-              <a:t>1/2/22</a:t>
+              <a:t>6/21/2025</a:t>
             </a:fld>
             <a:endParaRPr lang="en-US"/>
           </a:p>
@@ -2048,7 +2203,7 @@
 </file>
 
 <file path=ppt/slideLayouts/slideLayout8.xml><?xml version="1.0" encoding="utf-8"?>
-<p:sldLayout xmlns:a="http://schemas.openxmlformats.org/drawingml/2006/main" xmlns:r="http://schemas.openxmlformats.org/officeDocument/2006/relationships" xmlns:p="http://schemas.openxmlformats.org/presentationml/2006/main" type="objTx" preserve="1">
+<p:sldLayout xmlns:a="http://schemas.openxmlformats.org/drawingml/2006/main" xmlns:r="http://schemas.openxmlformats.org/officeDocument/2006/relationships" xmlns:p="http://schemas.openxmlformats.org/presentationml/2006/main" preserve="1" userDrawn="1">
   <p:cSld name="Content with Caption">
     <p:spTree>
       <p:nvGrpSpPr>
@@ -2076,20 +2231,22 @@
         </p:nvSpPr>
         <p:spPr>
           <a:xfrm>
-            <a:off x="457201" y="204787"/>
-            <a:ext cx="3008313" cy="871538"/>
+            <a:off x="457200" y="204787"/>
+            <a:ext cx="8229599" cy="417170"/>
           </a:xfrm>
         </p:spPr>
         <p:txBody>
-          <a:bodyPr anchor="b"/>
+          <a:bodyPr anchor="b">
+            <a:noAutofit/>
+          </a:bodyPr>
           <a:lstStyle>
             <a:lvl1pPr algn="l">
-              <a:defRPr sz="1500" b="1"/>
+              <a:defRPr sz="2400" b="1"/>
             </a:lvl1pPr>
           </a:lstStyle>
           <a:p>
             <a:r>
-              <a:rPr lang="en-US"/>
+              <a:rPr lang="en-US" dirty="0"/>
               <a:t>Click to edit Master title style</a:t>
             </a:r>
           </a:p>
@@ -2097,37 +2254,104 @@
       </p:sp>
       <p:sp>
         <p:nvSpPr>
-          <p:cNvPr id="3" name="Content Placeholder 2"/>
-          <p:cNvSpPr>
-            <a:spLocks noGrp="1"/>
-          </p:cNvSpPr>
-          <p:nvPr>
-            <p:ph idx="1"/>
+          <p:cNvPr id="4" name="Text Placeholder 3"/>
+          <p:cNvSpPr>
+            <a:spLocks noGrp="1"/>
+          </p:cNvSpPr>
+          <p:nvPr>
+            <p:ph type="body" sz="half" idx="2"/>
           </p:nvPr>
         </p:nvSpPr>
         <p:spPr>
           <a:xfrm>
-            <a:off x="3575050" y="204788"/>
-            <a:ext cx="5111750" cy="4389835"/>
+            <a:off x="468056" y="816960"/>
+            <a:ext cx="3008313" cy="3777663"/>
           </a:xfrm>
         </p:spPr>
         <p:txBody>
           <a:bodyPr/>
           <a:lstStyle>
+            <a:lvl1pPr marL="0" indent="0">
+              <a:buNone/>
+              <a:defRPr sz="1050"/>
+            </a:lvl1pPr>
+            <a:lvl2pPr marL="342900" indent="0">
+              <a:buNone/>
+              <a:defRPr sz="900"/>
+            </a:lvl2pPr>
+            <a:lvl3pPr marL="685800" indent="0">
+              <a:buNone/>
+              <a:defRPr sz="750"/>
+            </a:lvl3pPr>
+            <a:lvl4pPr marL="1028700" indent="0">
+              <a:buNone/>
+              <a:defRPr sz="675"/>
+            </a:lvl4pPr>
+            <a:lvl5pPr marL="1371600" indent="0">
+              <a:buNone/>
+              <a:defRPr sz="675"/>
+            </a:lvl5pPr>
+            <a:lvl6pPr marL="1714500" indent="0">
+              <a:buNone/>
+              <a:defRPr sz="675"/>
+            </a:lvl6pPr>
+            <a:lvl7pPr marL="2057400" indent="0">
+              <a:buNone/>
+              <a:defRPr sz="675"/>
+            </a:lvl7pPr>
+            <a:lvl8pPr marL="2400300" indent="0">
+              <a:buNone/>
+              <a:defRPr sz="675"/>
+            </a:lvl8pPr>
+            <a:lvl9pPr marL="2743200" indent="0">
+              <a:buNone/>
+              <a:defRPr sz="675"/>
+            </a:lvl9pPr>
+          </a:lstStyle>
+          <a:p>
+            <a:pPr lvl="0"/>
+            <a:r>
+              <a:rPr lang="en-US" dirty="0"/>
+              <a:t>Click to edit Master text styles</a:t>
+            </a:r>
+          </a:p>
+        </p:txBody>
+      </p:sp>
+      <p:sp>
+        <p:nvSpPr>
+          <p:cNvPr id="3" name="Content Placeholder 2"/>
+          <p:cNvSpPr>
+            <a:spLocks noGrp="1"/>
+          </p:cNvSpPr>
+          <p:nvPr>
+            <p:ph idx="1"/>
+          </p:nvPr>
+        </p:nvSpPr>
+        <p:spPr>
+          <a:xfrm>
+            <a:off x="3580842" y="794597"/>
+            <a:ext cx="5095102" cy="3800026"/>
+          </a:xfrm>
+        </p:spPr>
+        <p:txBody>
+          <a:bodyPr>
+            <a:normAutofit/>
+          </a:bodyPr>
+          <a:lstStyle>
             <a:lvl1pPr>
-              <a:defRPr sz="2400"/>
+              <a:defRPr sz="1600"/>
             </a:lvl1pPr>
             <a:lvl2pPr>
-              <a:defRPr sz="2100"/>
+              <a:defRPr sz="1600"/>
             </a:lvl2pPr>
             <a:lvl3pPr>
-              <a:defRPr sz="1800"/>
+              <a:defRPr sz="1200"/>
             </a:lvl3pPr>
             <a:lvl4pPr>
-              <a:defRPr sz="1500"/>
+              <a:defRPr sz="1100"/>
             </a:lvl4pPr>
             <a:lvl5pPr>
-              <a:defRPr sz="1500"/>
+              <a:defRPr sz="1100"/>
             </a:lvl5pPr>
             <a:lvl6pPr>
               <a:defRPr sz="1500"/>
@@ -2145,101 +2369,36 @@
           <a:p>
             <a:pPr lvl="0"/>
             <a:r>
-              <a:rPr lang="en-US"/>
+              <a:rPr lang="en-US" dirty="0"/>
               <a:t>Click to edit Master text styles</a:t>
             </a:r>
           </a:p>
           <a:p>
             <a:pPr lvl="1"/>
             <a:r>
-              <a:rPr lang="en-US"/>
+              <a:rPr lang="en-US" dirty="0"/>
               <a:t>Second level</a:t>
             </a:r>
           </a:p>
           <a:p>
             <a:pPr lvl="2"/>
             <a:r>
-              <a:rPr lang="en-US"/>
+              <a:rPr lang="en-US" dirty="0"/>
               <a:t>Third level</a:t>
             </a:r>
           </a:p>
           <a:p>
             <a:pPr lvl="3"/>
             <a:r>
-              <a:rPr lang="en-US"/>
+              <a:rPr lang="en-US" dirty="0"/>
               <a:t>Fourth level</a:t>
             </a:r>
           </a:p>
           <a:p>
             <a:pPr lvl="4"/>
             <a:r>
-              <a:rPr lang="en-US"/>
+              <a:rPr lang="en-US" dirty="0"/>
               <a:t>Fifth level</a:t>
-            </a:r>
-          </a:p>
-        </p:txBody>
-      </p:sp>
-      <p:sp>
-        <p:nvSpPr>
-          <p:cNvPr id="4" name="Text Placeholder 3"/>
-          <p:cNvSpPr>
-            <a:spLocks noGrp="1"/>
-          </p:cNvSpPr>
-          <p:nvPr>
-            <p:ph type="body" sz="half" idx="2"/>
-          </p:nvPr>
-        </p:nvSpPr>
-        <p:spPr>
-          <a:xfrm>
-            <a:off x="457201" y="1076326"/>
-            <a:ext cx="3008313" cy="3518297"/>
-          </a:xfrm>
-        </p:spPr>
-        <p:txBody>
-          <a:bodyPr/>
-          <a:lstStyle>
-            <a:lvl1pPr marL="0" indent="0">
-              <a:buNone/>
-              <a:defRPr sz="1050"/>
-            </a:lvl1pPr>
-            <a:lvl2pPr marL="342900" indent="0">
-              <a:buNone/>
-              <a:defRPr sz="900"/>
-            </a:lvl2pPr>
-            <a:lvl3pPr marL="685800" indent="0">
-              <a:buNone/>
-              <a:defRPr sz="750"/>
-            </a:lvl3pPr>
-            <a:lvl4pPr marL="1028700" indent="0">
-              <a:buNone/>
-              <a:defRPr sz="675"/>
-            </a:lvl4pPr>
-            <a:lvl5pPr marL="1371600" indent="0">
-              <a:buNone/>
-              <a:defRPr sz="675"/>
-            </a:lvl5pPr>
-            <a:lvl6pPr marL="1714500" indent="0">
-              <a:buNone/>
-              <a:defRPr sz="675"/>
-            </a:lvl6pPr>
-            <a:lvl7pPr marL="2057400" indent="0">
-              <a:buNone/>
-              <a:defRPr sz="675"/>
-            </a:lvl7pPr>
-            <a:lvl8pPr marL="2400300" indent="0">
-              <a:buNone/>
-              <a:defRPr sz="675"/>
-            </a:lvl8pPr>
-            <a:lvl9pPr marL="2743200" indent="0">
-              <a:buNone/>
-              <a:defRPr sz="675"/>
-            </a:lvl9pPr>
-          </a:lstStyle>
-          <a:p>
-            <a:pPr lvl="0"/>
-            <a:r>
-              <a:rPr lang="en-US"/>
-              <a:t>Click to edit Master text styles</a:t>
             </a:r>
           </a:p>
         </p:txBody>
@@ -2261,7 +2420,7 @@
           <a:p>
             <a:fld id="{241EB5C9-1307-BA42-ABA2-0BC069CD8E7F}" type="datetimeFigureOut">
               <a:rPr lang="en-US" smtClean="0"/>
-              <a:t>1/2/22</a:t>
+              <a:t>6/21/2025</a:t>
             </a:fld>
             <a:endParaRPr lang="en-US"/>
           </a:p>
@@ -2513,7 +2672,7 @@
           <a:p>
             <a:fld id="{241EB5C9-1307-BA42-ABA2-0BC069CD8E7F}" type="datetimeFigureOut">
               <a:rPr lang="en-US" smtClean="0"/>
-              <a:t>1/2/22</a:t>
+              <a:t>6/21/2025</a:t>
             </a:fld>
             <a:endParaRPr lang="en-US"/>
           </a:p>
@@ -2655,35 +2814,35 @@
           <a:p>
             <a:pPr lvl="0"/>
             <a:r>
-              <a:rPr lang="en-US"/>
+              <a:rPr dirty="0" lang="en-US"/>
               <a:t>Click to edit Master text styles</a:t>
             </a:r>
           </a:p>
           <a:p>
             <a:pPr lvl="1"/>
             <a:r>
-              <a:rPr lang="en-US"/>
+              <a:rPr dirty="0" lang="en-US"/>
               <a:t>Second level</a:t>
             </a:r>
           </a:p>
           <a:p>
             <a:pPr lvl="2"/>
             <a:r>
-              <a:rPr lang="en-US"/>
+              <a:rPr dirty="0" lang="en-US"/>
               <a:t>Third level</a:t>
             </a:r>
           </a:p>
           <a:p>
             <a:pPr lvl="3"/>
             <a:r>
-              <a:rPr lang="en-US"/>
+              <a:rPr dirty="0" lang="en-US"/>
               <a:t>Fourth level</a:t>
             </a:r>
           </a:p>
           <a:p>
             <a:pPr lvl="4"/>
             <a:r>
-              <a:rPr lang="en-US"/>
+              <a:rPr dirty="0" lang="en-US"/>
               <a:t>Fifth level</a:t>
             </a:r>
           </a:p>
@@ -2724,7 +2883,7 @@
           <a:p>
             <a:fld id="{241EB5C9-1307-BA42-ABA2-0BC069CD8E7F}" type="datetimeFigureOut">
               <a:rPr lang="en-US" smtClean="0"/>
-              <a:t>1/2/22</a:t>
+              <a:t>6/21/2025</a:t>
             </a:fld>
             <a:endParaRPr lang="en-US"/>
           </a:p>
@@ -2853,7 +3012,7 @@
         </a:spcBef>
         <a:buFont typeface="Arial"/>
         <a:buChar char="•"/>
-        <a:defRPr kern="1200" sz="2400">
+        <a:defRPr kern="1200" sz="1100">
           <a:solidFill>
             <a:schemeClr val="tx1"/>
           </a:solidFill>
@@ -2868,7 +3027,7 @@
         </a:spcBef>
         <a:buFont typeface="Arial"/>
         <a:buChar char="–"/>
-        <a:defRPr kern="1200" sz="2100">
+        <a:defRPr kern="1200" sz="1100">
           <a:solidFill>
             <a:schemeClr val="tx1"/>
           </a:solidFill>
@@ -2883,7 +3042,7 @@
         </a:spcBef>
         <a:buFont typeface="Arial"/>
         <a:buChar char="•"/>
-        <a:defRPr kern="1200" sz="1800">
+        <a:defRPr kern="1200" sz="1000">
           <a:solidFill>
             <a:schemeClr val="tx1"/>
           </a:solidFill>
@@ -2898,7 +3057,7 @@
         </a:spcBef>
         <a:buFont typeface="Arial"/>
         <a:buChar char="–"/>
-        <a:defRPr kern="1200" sz="1500">
+        <a:defRPr kern="1200" sz="900">
           <a:solidFill>
             <a:schemeClr val="tx1"/>
           </a:solidFill>
@@ -2913,7 +3072,7 @@
         </a:spcBef>
         <a:buFont typeface="Arial"/>
         <a:buChar char="»"/>
-        <a:defRPr kern="1200" sz="1500">
+        <a:defRPr kern="1200" sz="900">
           <a:solidFill>
             <a:schemeClr val="tx1"/>
           </a:solidFill>
@@ -3181,7 +3340,7 @@
             </a:pPr>
             <a:r>
               <a:rPr/>
-              <a:t>2025-06-21</a:t>
+              <a:t>June 21, 2025</a:t>
             </a:r>
           </a:p>
         </p:txBody>
@@ -3220,8 +3379,8 @@
         </p:nvSpPr>
         <p:spPr>
           <a:xfrm>
-            <a:off x="457201" y="204787"/>
-            <a:ext cx="3008313" cy="871538"/>
+            <a:off x="457200" y="204787"/>
+            <a:ext cx="8229599" cy="417170"/>
           </a:xfrm>
         </p:spPr>
         <p:txBody>
@@ -3233,7 +3392,7 @@
             </a:pPr>
             <a:r>
               <a:rPr/>
-              <a:t>7. Crime types by time of day</a:t>
+              <a:t>6. Crime distribution by area</a:t>
             </a:r>
           </a:p>
         </p:txBody>
@@ -3258,16 +3417,14 @@
             </a:pPr>
             <a:r>
               <a:rPr/>
-              <a:t>The chart below shows a heatmap of the likelyhood of specific crimes depending on time of day. Fifteen most common offences are presented.</a:t>
+              <a:t>The chart below shows crime distribution in the LA region by area. Five most common offences are presented.</a:t>
             </a:r>
           </a:p>
           <a:p>
             <a:pPr lvl="0" indent="0" marL="0">
-              <a:spcBef>
-                <a:spcPts val="3000"/>
-              </a:spcBef>
               <a:buNone/>
             </a:pPr>
+            <a:br/>
             <a:r>
               <a:rPr b="1"/>
               <a:t>Conclusion:</a:t>
@@ -3279,7 +3436,144 @@
             </a:pPr>
             <a:r>
               <a:rPr/>
-              <a:t>Vehicle-related crimes (stealing or burglary from vehicle) are committed significantly more often during evening hours, starting around 5:00 PM. Most cases of theft occur in the middle of the day, whereas trespassing is clearly limited to early morning hours. Offences such as burglary are equally distributed throughout the day.</a:t>
+              <a:t>For certain crimes there are marked differences in the number of reports depending on area. For instance, “BURGLARY FROM VEHICLE” occurred overwhelmingly in the “Central” area (with more than twice as many reports as in any other area). Other offences show more homogeneous distribution (e.g. “VANDALISM”).</a:t>
+            </a:r>
+          </a:p>
+        </p:txBody>
+      </p:sp>
+      <p:pic>
+        <p:nvPicPr>
+          <p:cNvPr descr="Project_Quarto_R_files/figure-pptx/plot-area-1.png" id="0" name="Picture 1"/>
+          <p:cNvPicPr>
+            <a:picLocks noGrp="1" noChangeAspect="1"/>
+          </p:cNvPicPr>
+          <p:nvPr/>
+        </p:nvPicPr>
+        <p:blipFill>
+          <a:blip r:embed="rId2"/>
+          <a:stretch>
+            <a:fillRect/>
+          </a:stretch>
+        </p:blipFill>
+        <p:spPr bwMode="auto">
+          <a:xfrm>
+            <a:off x="4216400" y="787400"/>
+            <a:ext cx="3797300" cy="3797300"/>
+          </a:xfrm>
+          <a:prstGeom prst="rect">
+            <a:avLst/>
+          </a:prstGeom>
+          <a:noFill/>
+          <a:ln w="9525">
+            <a:noFill/>
+            <a:headEnd/>
+            <a:tailEnd/>
+          </a:ln>
+        </p:spPr>
+      </p:pic>
+    </p:spTree>
+  </p:cSld>
+</p:sld>
+</file>
+
+<file path=ppt/slides/slide11.xml><?xml version="1.0" encoding="utf-8"?>
+<p:sld xmlns:a="http://schemas.openxmlformats.org/drawingml/2006/main" xmlns:r="http://schemas.openxmlformats.org/officeDocument/2006/relationships" xmlns:p="http://schemas.openxmlformats.org/presentationml/2006/main">
+  <p:cSld>
+    <p:spTree>
+      <p:nvGrpSpPr>
+        <p:cNvPr id="1" name=""/>
+        <p:cNvGrpSpPr/>
+        <p:nvPr/>
+      </p:nvGrpSpPr>
+      <p:grpSpPr>
+        <a:xfrm>
+          <a:off x="0" y="0"/>
+          <a:ext cx="0" cy="0"/>
+          <a:chOff x="0" y="0"/>
+          <a:chExt cx="0" cy="0"/>
+        </a:xfrm>
+      </p:grpSpPr>
+      <p:sp>
+        <p:nvSpPr>
+          <p:cNvPr id="2" name="Title 1"/>
+          <p:cNvSpPr>
+            <a:spLocks noGrp="1"/>
+          </p:cNvSpPr>
+          <p:nvPr>
+            <p:ph type="title"/>
+          </p:nvPr>
+        </p:nvSpPr>
+        <p:spPr>
+          <a:xfrm>
+            <a:off x="457200" y="204787"/>
+            <a:ext cx="8229599" cy="417170"/>
+          </a:xfrm>
+        </p:spPr>
+        <p:txBody>
+          <a:bodyPr/>
+          <a:lstStyle/>
+          <a:p>
+            <a:pPr lvl="0" indent="0" marL="0">
+              <a:buNone/>
+            </a:pPr>
+            <a:r>
+              <a:rPr/>
+              <a:t>7. Crime types by time of day</a:t>
+            </a:r>
+          </a:p>
+        </p:txBody>
+      </p:sp>
+      <p:sp>
+        <p:nvSpPr>
+          <p:cNvPr id="4" name="Text Placeholder 3"/>
+          <p:cNvSpPr>
+            <a:spLocks noGrp="1"/>
+          </p:cNvSpPr>
+          <p:nvPr>
+            <p:ph idx="2" sz="half" type="body"/>
+          </p:nvPr>
+        </p:nvSpPr>
+        <p:spPr/>
+        <p:txBody>
+          <a:bodyPr/>
+          <a:lstStyle/>
+          <a:p>
+            <a:pPr lvl="0" indent="0" marL="0">
+              <a:buNone/>
+            </a:pPr>
+            <a:r>
+              <a:rPr/>
+              <a:t>The chart below shows a heatmap of the probability of specific crimes depending on time of day. Fifteen most common offences are presented.</a:t>
+            </a:r>
+          </a:p>
+          <a:p>
+            <a:pPr lvl="0" indent="0" marL="0">
+              <a:buNone/>
+            </a:pPr>
+            <a:br/>
+            <a:r>
+              <a:rPr b="1"/>
+              <a:t>Conclusion:</a:t>
+            </a:r>
+            <a:br/>
+            <a:r>
+              <a:rPr/>
+              <a:t>• Vehicle-related crimes (stealing or burglary from vehicle) are committed significantly more often during evening hours, starting around 5:00 PM.</a:t>
+            </a:r>
+            <a:br/>
+            <a:r>
+              <a:rPr/>
+              <a:t>• Most cases of theft occur in the middle of the day.</a:t>
+            </a:r>
+            <a:br/>
+            <a:r>
+              <a:rPr/>
+              <a:t>• Trespassing is clearly limited to early morning hours.</a:t>
+            </a:r>
+            <a:br/>
+            <a:r>
+              <a:rPr/>
+              <a:t>• Offences such as burglary are equally distributed throughout the day.</a:t>
             </a:r>
           </a:p>
           <a:p>
@@ -3306,8 +3600,8 @@
         </p:blipFill>
         <p:spPr bwMode="auto">
           <a:xfrm>
-            <a:off x="3568700" y="1117600"/>
-            <a:ext cx="5105400" cy="2552700"/>
+            <a:off x="3568700" y="1409700"/>
+            <a:ext cx="5092700" cy="2540000"/>
           </a:xfrm>
           <a:prstGeom prst="rect">
             <a:avLst/>
@@ -3387,7 +3681,7 @@
               <a:rPr>
                 <a:hlinkClick r:id="rId2" action="ppaction://hlinksldjump"/>
               </a:rPr>
-              <a:t>1. Quarto project</a:t>
+              <a:t>1. Information on the Quarto project</a:t>
             </a:r>
           </a:p>
           <a:p>
@@ -3405,7 +3699,7 @@
               <a:rPr>
                 <a:hlinkClick r:id="rId4" action="ppaction://hlinksldjump"/>
               </a:rPr>
-              <a:t>3. Areas most affected by crime</a:t>
+              <a:t>3. Victim age analysis</a:t>
             </a:r>
           </a:p>
           <a:p>
@@ -3414,7 +3708,7 @@
               <a:rPr>
                 <a:hlinkClick r:id="rId5" action="ppaction://hlinksldjump"/>
               </a:rPr>
-              <a:t>4. Victim age analysis</a:t>
+              <a:t>4. Geographical distribution of crime</a:t>
             </a:r>
           </a:p>
           <a:p>
@@ -3423,7 +3717,7 @@
               <a:rPr>
                 <a:hlinkClick r:id="rId6" action="ppaction://hlinksldjump"/>
               </a:rPr>
-              <a:t>5. Geographical distribution of crime</a:t>
+              <a:t>5. Areas most affected by crime</a:t>
             </a:r>
           </a:p>
           <a:p>
@@ -3480,8 +3774,8 @@
         </p:nvSpPr>
         <p:spPr>
           <a:xfrm>
-            <a:off x="457201" y="204787"/>
-            <a:ext cx="3008313" cy="871538"/>
+            <a:off x="457200" y="204787"/>
+            <a:ext cx="8229599" cy="417170"/>
           </a:xfrm>
         </p:spPr>
         <p:txBody>
@@ -3493,7 +3787,7 @@
             </a:pPr>
             <a:r>
               <a:rPr/>
-              <a:t>1. Quarto project</a:t>
+              <a:t>1. Information on the Quarto project</a:t>
             </a:r>
           </a:p>
         </p:txBody>
@@ -3598,8 +3892,8 @@
         </p:blipFill>
         <p:spPr bwMode="auto">
           <a:xfrm>
-            <a:off x="3771900" y="203200"/>
-            <a:ext cx="4711700" cy="4381500"/>
+            <a:off x="4076700" y="787400"/>
+            <a:ext cx="4076700" cy="3797300"/>
           </a:xfrm>
           <a:prstGeom prst="rect">
             <a:avLst/>
@@ -3646,8 +3940,8 @@
         </p:nvSpPr>
         <p:spPr>
           <a:xfrm>
-            <a:off x="457201" y="204787"/>
-            <a:ext cx="3008313" cy="871538"/>
+            <a:off x="457200" y="204787"/>
+            <a:ext cx="8229599" cy="417170"/>
           </a:xfrm>
         </p:spPr>
         <p:txBody>
@@ -3684,7 +3978,7 @@
             </a:pPr>
             <a:r>
               <a:rPr/>
-              <a:t>The chart below shows an analysis of Los Angeles crime types in 2024 by frequency.</a:t>
+              <a:t>This chart shows an analysis of Los Angeles crime types in 2024 by frequency.</a:t>
             </a:r>
           </a:p>
           <a:p>
@@ -3698,11 +3992,9 @@
           </a:p>
           <a:p>
             <a:pPr lvl="0" indent="0" marL="0">
-              <a:spcBef>
-                <a:spcPts val="3000"/>
-              </a:spcBef>
               <a:buNone/>
             </a:pPr>
+            <a:br/>
             <a:r>
               <a:rPr b="1"/>
               <a:t>Conclusion:</a:t>
@@ -3716,12 +4008,6 @@
               <a:rPr/>
               <a:t>The most common crime type in the LA area in 2004 was vehicle theft (an outstanding number of over 20,000 cases reported). The remaining types of offences are less variable in frequency, and none of them exceeded 10,000.</a:t>
             </a:r>
-          </a:p>
-          <a:p>
-            <a:pPr lvl="0" indent="0" marL="0">
-              <a:buNone/>
-            </a:pPr>
-            <a:br/>
           </a:p>
         </p:txBody>
       </p:sp>
@@ -3741,8 +4027,8 @@
         </p:blipFill>
         <p:spPr bwMode="auto">
           <a:xfrm>
-            <a:off x="3568700" y="203200"/>
-            <a:ext cx="5105400" cy="4381500"/>
+            <a:off x="3898900" y="787400"/>
+            <a:ext cx="4432300" cy="3797300"/>
           </a:xfrm>
           <a:prstGeom prst="rect">
             <a:avLst/>
@@ -3789,8 +4075,8 @@
         </p:nvSpPr>
         <p:spPr>
           <a:xfrm>
-            <a:off x="457201" y="204787"/>
-            <a:ext cx="3008313" cy="871538"/>
+            <a:off x="457200" y="204787"/>
+            <a:ext cx="8229599" cy="417170"/>
           </a:xfrm>
         </p:spPr>
         <p:txBody>
@@ -3802,7 +4088,7 @@
             </a:pPr>
             <a:r>
               <a:rPr/>
-              <a:t>3. Areas most affected by crime</a:t>
+              <a:t>3. Victim age analysis</a:t>
             </a:r>
           </a:p>
         </p:txBody>
@@ -3821,15 +4107,6 @@
         <p:txBody>
           <a:bodyPr/>
           <a:lstStyle/>
-          <a:p>
-            <a:pPr lvl="0" indent="0" marL="0">
-              <a:buNone/>
-            </a:pPr>
-            <a:r>
-              <a:rPr/>
-              <a:t>The chart below shows 10 areas with the highest crime rate.</a:t>
-            </a:r>
-          </a:p>
           <a:p>
             <a:pPr lvl="0" indent="0" marL="0">
               <a:spcBef>
@@ -3839,16 +4116,7 @@
             </a:pPr>
             <a:r>
               <a:rPr b="1"/>
-              <a:t>Conclusion:</a:t>
-            </a:r>
-          </a:p>
-          <a:p>
-            <a:pPr lvl="0" indent="0" marL="0">
-              <a:buNone/>
-            </a:pPr>
-            <a:r>
-              <a:rPr/>
-              <a:t>The diameters of the circles are approximately proportional to the number of reported crimes in the respective areas. Most reports are from the Central area, followed by Southwest and Pacific.</a:t>
+              <a:t>Victim age structure: entire sample</a:t>
             </a:r>
           </a:p>
           <a:p>
@@ -3856,12 +4124,28 @@
               <a:buNone/>
             </a:pPr>
             <a:br/>
+            <a:r>
+              <a:rPr b="1"/>
+              <a:t>Conclusion:</a:t>
+            </a:r>
+            <a:r>
+              <a:rPr/>
+              <a:t> This chart presents age distribution in </a:t>
+            </a:r>
+            <a:r>
+              <a:rPr i="1"/>
+              <a:t>the entire population</a:t>
+            </a:r>
+            <a:r>
+              <a:rPr/>
+              <a:t>. Most victims are adults aged 20–40 years. The data seems to be distributed normally, as confirmed below in a statistical test.</a:t>
+            </a:r>
           </a:p>
         </p:txBody>
       </p:sp>
       <p:pic>
         <p:nvPicPr>
-          <p:cNvPr descr="Project_Quarto_R_files/figure-pptx/plot-affected-areas-1.png" id="0" name="Picture 1"/>
+          <p:cNvPr descr="Project_Quarto_R_files/figure-pptx/age-histogram1_new-1.png" id="0" name="Picture 1"/>
           <p:cNvPicPr>
             <a:picLocks noGrp="1" noChangeAspect="1"/>
           </p:cNvPicPr>
@@ -3875,8 +4159,8 @@
         </p:blipFill>
         <p:spPr bwMode="auto">
           <a:xfrm>
-            <a:off x="3937000" y="203200"/>
-            <a:ext cx="4381500" cy="4381500"/>
+            <a:off x="3568700" y="1409700"/>
+            <a:ext cx="5092700" cy="2540000"/>
           </a:xfrm>
           <a:prstGeom prst="rect">
             <a:avLst/>
@@ -3913,116 +4197,41 @@
       </p:grpSpPr>
       <p:sp>
         <p:nvSpPr>
-          <p:cNvPr id="2" name="Title 1"/>
-          <p:cNvSpPr>
-            <a:spLocks noGrp="1"/>
-          </p:cNvSpPr>
-          <p:nvPr>
-            <p:ph type="title"/>
-          </p:nvPr>
-        </p:nvSpPr>
-        <p:spPr>
-          <a:xfrm>
-            <a:off x="457201" y="204787"/>
-            <a:ext cx="3008313" cy="871538"/>
-          </a:xfrm>
-        </p:spPr>
+          <p:cNvPr id="4" name="Text Placeholder 3"/>
+          <p:cNvSpPr>
+            <a:spLocks noGrp="1"/>
+          </p:cNvSpPr>
+          <p:nvPr>
+            <p:ph idx="2" sz="half" type="body"/>
+          </p:nvPr>
+        </p:nvSpPr>
+        <p:spPr/>
         <p:txBody>
           <a:bodyPr/>
           <a:lstStyle/>
           <a:p>
             <a:pPr lvl="0" indent="0" marL="0">
+              <a:spcBef>
+                <a:spcPts val="3000"/>
+              </a:spcBef>
               <a:buNone/>
             </a:pPr>
             <a:r>
-              <a:rPr/>
-              <a:t>4. Victim age analysis</a:t>
-            </a:r>
-          </a:p>
-        </p:txBody>
-      </p:sp>
-      <p:sp>
-        <p:nvSpPr>
-          <p:cNvPr id="4" name="Text Placeholder 3"/>
-          <p:cNvSpPr>
-            <a:spLocks noGrp="1"/>
-          </p:cNvSpPr>
-          <p:nvPr>
-            <p:ph idx="2" sz="half" type="body"/>
-          </p:nvPr>
-        </p:nvSpPr>
-        <p:spPr/>
-        <p:txBody>
-          <a:bodyPr/>
-          <a:lstStyle/>
+              <a:rPr b="1"/>
+              <a:t>Victim age structure: by age</a:t>
+            </a:r>
+          </a:p>
           <a:p>
             <a:pPr lvl="0" indent="0" marL="0">
               <a:buNone/>
             </a:pPr>
-            <a:r>
-              <a:rPr/>
-              <a:t>This section presents the results of victim age analysis. Only male and female genders are presented (other/unknown categories are omitted due to low sample size).</a:t>
-            </a:r>
-          </a:p>
-          <a:p>
-            <a:pPr lvl="0" indent="0" marL="0">
-              <a:buNone/>
-            </a:pPr>
-            <a:r>
-              <a:rPr b="1"/>
-              <a:t>Histogram plot – total population:</a:t>
-            </a:r>
-          </a:p>
-          <a:p>
-            <a:pPr lvl="0" indent="0" marL="0">
-              <a:buNone/>
-            </a:pPr>
-          </a:p>
-          <a:p>
-            <a:pPr lvl="0" indent="0" marL="0">
-              <a:buNone/>
-            </a:pPr>
+            <a:br/>
             <a:r>
               <a:rPr b="1"/>
               <a:t>Conclusion:</a:t>
             </a:r>
             <a:r>
               <a:rPr/>
-              <a:t> This chart present </a:t>
-            </a:r>
-            <a:r>
-              <a:rPr i="1"/>
-              <a:t>the entire population</a:t>
-            </a:r>
-            <a:r>
-              <a:rPr/>
-              <a:t>. Most victims are adults aged 20–40 years. The data seems to be distributed normally, as confirmed below in a statistical test.</a:t>
-            </a:r>
-          </a:p>
-          <a:p>
-            <a:pPr lvl="0" indent="0" marL="0">
-              <a:buNone/>
-            </a:pPr>
-            <a:r>
-              <a:rPr b="1"/>
-              <a:t>Histogram plot – victim age distribution by sex:</a:t>
-            </a:r>
-          </a:p>
-          <a:p>
-            <a:pPr lvl="0" indent="0" marL="0">
-              <a:buNone/>
-            </a:pPr>
-          </a:p>
-          <a:p>
-            <a:pPr lvl="0" indent="0" marL="0">
-              <a:buNone/>
-            </a:pPr>
-            <a:r>
-              <a:rPr b="1"/>
-              <a:t>Conclusion:</a:t>
-            </a:r>
-            <a:r>
-              <a:rPr/>
               <a:t> This chart presents overimposed histograms of the age for </a:t>
             </a:r>
             <a:r>
@@ -4049,336 +4258,77 @@
               <a:rPr/>
               <a:t> victims are slightly older.</a:t>
             </a:r>
-          </a:p>
-          <a:p>
-            <a:pPr lvl="0" indent="0" marL="0">
-              <a:buNone/>
-            </a:pPr>
-            <a:r>
-              <a:rPr b="1"/>
-              <a:t>Summary stastistics:</a:t>
-            </a:r>
-          </a:p>
-        </p:txBody>
-      </p:sp>
-      <p:graphicFrame>
-        <p:nvGraphicFramePr>
-          <p:cNvPr id="6" name="Content Placeholder 5"/>
-          <p:cNvGraphicFramePr>
-            <a:graphicFrameLocks noGrp="1"/>
-          </p:cNvGraphicFramePr>
-          <p:nvPr>
-            <p:ph idx="1"/>
-          </p:nvPr>
-        </p:nvGraphicFramePr>
-        <p:xfrm>
-          <a:off x="3568700" y="203200"/>
-          <a:ext cx="5105400" cy="4381500"/>
-        </p:xfrm>
-        <a:graphic>
-          <a:graphicData uri="http://schemas.openxmlformats.org/drawingml/2006/table">
-            <a:tbl>
-              <a:tblPr firstRow="1" bandRow="1">
-                <a:tableStyleId>{5C22544A-7EE6-4342-B048-85BDC9FD1C3A}</a:tableStyleId>
-              </a:tblPr>
-              <a:tblGrid>
-                <a:gridCol w="558800"/>
-                <a:gridCol w="558800"/>
-                <a:gridCol w="558800"/>
-                <a:gridCol w="558800"/>
-                <a:gridCol w="558800"/>
-                <a:gridCol w="558800"/>
-                <a:gridCol w="558800"/>
-                <a:gridCol w="558800"/>
-                <a:gridCol w="558800"/>
-              </a:tblGrid>
-              <a:tr h="0">
-                <a:tc>
-                  <a:txBody>
-                    <a:bodyPr/>
-                    <a:lstStyle/>
-                    <a:p>
-                      <a:pPr lvl="0" indent="0" marL="0" algn="l">
-                        <a:buNone/>
-                      </a:pPr>
-                      <a:r>
-                        <a:rPr/>
-                        <a:t>Variable</a:t>
-                      </a:r>
-                    </a:p>
-                  </a:txBody>
-                  <a:tcPr/>
-                </a:tc>
-                <a:tc>
-                  <a:txBody>
-                    <a:bodyPr/>
-                    <a:lstStyle/>
-                    <a:p>
-                      <a:pPr lvl="0" indent="0" marL="0" algn="l">
-                        <a:buNone/>
-                      </a:pPr>
-                      <a:r>
-                        <a:rPr/>
-                        <a:t>NotNA</a:t>
-                      </a:r>
-                    </a:p>
-                  </a:txBody>
-                  <a:tcPr/>
-                </a:tc>
-                <a:tc>
-                  <a:txBody>
-                    <a:bodyPr/>
-                    <a:lstStyle/>
-                    <a:p>
-                      <a:pPr lvl="0" indent="0" marL="0" algn="l">
-                        <a:buNone/>
-                      </a:pPr>
-                      <a:r>
-                        <a:rPr/>
-                        <a:t>Mean</a:t>
-                      </a:r>
-                    </a:p>
-                  </a:txBody>
-                  <a:tcPr/>
-                </a:tc>
-                <a:tc>
-                  <a:txBody>
-                    <a:bodyPr/>
-                    <a:lstStyle/>
-                    <a:p>
-                      <a:pPr lvl="0" indent="0" marL="0" algn="l">
-                        <a:buNone/>
-                      </a:pPr>
-                      <a:r>
-                        <a:rPr/>
-                        <a:t>Median</a:t>
-                      </a:r>
-                    </a:p>
-                  </a:txBody>
-                  <a:tcPr/>
-                </a:tc>
-                <a:tc>
-                  <a:txBody>
-                    <a:bodyPr/>
-                    <a:lstStyle/>
-                    <a:p>
-                      <a:pPr lvl="0" indent="0" marL="0" algn="l">
-                        <a:buNone/>
-                      </a:pPr>
-                      <a:r>
-                        <a:rPr/>
-                        <a:t>Sd</a:t>
-                      </a:r>
-                    </a:p>
-                  </a:txBody>
-                  <a:tcPr/>
-                </a:tc>
-                <a:tc>
-                  <a:txBody>
-                    <a:bodyPr/>
-                    <a:lstStyle/>
-                    <a:p>
-                      <a:pPr lvl="0" indent="0" marL="0" algn="l">
-                        <a:buNone/>
-                      </a:pPr>
-                      <a:r>
-                        <a:rPr/>
-                        <a:t>Min</a:t>
-                      </a:r>
-                    </a:p>
-                  </a:txBody>
-                  <a:tcPr/>
-                </a:tc>
-                <a:tc>
-                  <a:txBody>
-                    <a:bodyPr/>
-                    <a:lstStyle/>
-                    <a:p>
-                      <a:pPr lvl="0" indent="0" marL="0" algn="l">
-                        <a:buNone/>
-                      </a:pPr>
-                      <a:r>
-                        <a:rPr/>
-                        <a:t>Pctile[25]</a:t>
-                      </a:r>
-                    </a:p>
-                  </a:txBody>
-                  <a:tcPr/>
-                </a:tc>
-                <a:tc>
-                  <a:txBody>
-                    <a:bodyPr/>
-                    <a:lstStyle/>
-                    <a:p>
-                      <a:pPr lvl="0" indent="0" marL="0" algn="l">
-                        <a:buNone/>
-                      </a:pPr>
-                      <a:r>
-                        <a:rPr/>
-                        <a:t>Pctile[75]</a:t>
-                      </a:r>
-                    </a:p>
-                  </a:txBody>
-                  <a:tcPr/>
-                </a:tc>
-                <a:tc>
-                  <a:txBody>
-                    <a:bodyPr/>
-                    <a:lstStyle/>
-                    <a:p>
-                      <a:pPr lvl="0" indent="0" marL="0" algn="l">
-                        <a:buNone/>
-                      </a:pPr>
-                      <a:r>
-                        <a:rPr/>
-                        <a:t>Max</a:t>
-                      </a:r>
-                    </a:p>
-                  </a:txBody>
-                  <a:tcPr/>
-                </a:tc>
-              </a:tr>
-              <a:tr h="0">
-                <a:tc>
-                  <a:txBody>
-                    <a:bodyPr/>
-                    <a:lstStyle/>
-                    <a:p>
-                      <a:pPr lvl="0" indent="0" marL="0" algn="l">
-                        <a:buNone/>
-                      </a:pPr>
-                      <a:r>
-                        <a:rPr/>
-                        <a:t>Victim age</a:t>
-                      </a:r>
-                    </a:p>
-                  </a:txBody>
-                </a:tc>
-                <a:tc>
-                  <a:txBody>
-                    <a:bodyPr/>
-                    <a:lstStyle/>
-                    <a:p>
-                      <a:pPr lvl="0" indent="0" marL="0" algn="l">
-                        <a:buNone/>
-                      </a:pPr>
-                      <a:r>
-                        <a:rPr/>
-                        <a:t>76839</a:t>
-                      </a:r>
-                    </a:p>
-                  </a:txBody>
-                </a:tc>
-                <a:tc>
-                  <a:txBody>
-                    <a:bodyPr/>
-                    <a:lstStyle/>
-                    <a:p>
-                      <a:pPr lvl="0" indent="0" marL="0" algn="l">
-                        <a:buNone/>
-                      </a:pPr>
-                      <a:r>
-                        <a:rPr/>
-                        <a:t>39</a:t>
-                      </a:r>
-                    </a:p>
-                  </a:txBody>
-                </a:tc>
-                <a:tc>
-                  <a:txBody>
-                    <a:bodyPr/>
-                    <a:lstStyle/>
-                    <a:p>
-                      <a:pPr lvl="0" indent="0" marL="0" algn="l">
-                        <a:buNone/>
-                      </a:pPr>
-                      <a:r>
-                        <a:rPr/>
-                        <a:t>36</a:t>
-                      </a:r>
-                    </a:p>
-                  </a:txBody>
-                </a:tc>
-                <a:tc>
-                  <a:txBody>
-                    <a:bodyPr/>
-                    <a:lstStyle/>
-                    <a:p>
-                      <a:pPr lvl="0" indent="0" marL="0" algn="l">
-                        <a:buNone/>
-                      </a:pPr>
-                      <a:r>
-                        <a:rPr/>
-                        <a:t>15</a:t>
-                      </a:r>
-                    </a:p>
-                  </a:txBody>
-                </a:tc>
-                <a:tc>
-                  <a:txBody>
-                    <a:bodyPr/>
-                    <a:lstStyle/>
-                    <a:p>
-                      <a:pPr lvl="0" indent="0" marL="0" algn="l">
-                        <a:buNone/>
-                      </a:pPr>
-                      <a:r>
-                        <a:rPr/>
-                        <a:t>2</a:t>
-                      </a:r>
-                    </a:p>
-                  </a:txBody>
-                </a:tc>
-                <a:tc>
-                  <a:txBody>
-                    <a:bodyPr/>
-                    <a:lstStyle/>
-                    <a:p>
-                      <a:pPr lvl="0" indent="0" marL="0" algn="l">
-                        <a:buNone/>
-                      </a:pPr>
-                      <a:r>
-                        <a:rPr/>
-                        <a:t>27</a:t>
-                      </a:r>
-                    </a:p>
-                  </a:txBody>
-                </a:tc>
-                <a:tc>
-                  <a:txBody>
-                    <a:bodyPr/>
-                    <a:lstStyle/>
-                    <a:p>
-                      <a:pPr lvl="0" indent="0" marL="0" algn="l">
-                        <a:buNone/>
-                      </a:pPr>
-                      <a:r>
-                        <a:rPr/>
-                        <a:t>49</a:t>
-                      </a:r>
-                    </a:p>
-                  </a:txBody>
-                </a:tc>
-                <a:tc>
-                  <a:txBody>
-                    <a:bodyPr/>
-                    <a:lstStyle/>
-                    <a:p>
-                      <a:pPr lvl="0" indent="0" marL="0" algn="l">
-                        <a:buNone/>
-                      </a:pPr>
-                      <a:r>
-                        <a:rPr/>
-                        <a:t>99</a:t>
-                      </a:r>
-                    </a:p>
-                  </a:txBody>
-                </a:tc>
-              </a:tr>
-            </a:tbl>
-          </a:graphicData>
-        </a:graphic>
-      </p:graphicFrame>
+            <a:br/>
+            <a:br/>
+            <a:r>
+              <a:rPr/>
+              <a:t>Only </a:t>
+            </a:r>
+            <a:r>
+              <a:rPr i="1"/>
+              <a:t>male</a:t>
+            </a:r>
+            <a:r>
+              <a:rPr/>
+              <a:t> and </a:t>
+            </a:r>
+            <a:r>
+              <a:rPr i="1"/>
+              <a:t>female</a:t>
+            </a:r>
+            <a:r>
+              <a:rPr/>
+              <a:t> genders are included (categories </a:t>
+            </a:r>
+            <a:r>
+              <a:rPr i="1"/>
+              <a:t>other</a:t>
+            </a:r>
+            <a:r>
+              <a:rPr/>
+              <a:t>/</a:t>
+            </a:r>
+            <a:r>
+              <a:rPr i="1"/>
+              <a:t>unknown</a:t>
+            </a:r>
+            <a:r>
+              <a:rPr/>
+              <a:t> were omitted due to low sample size).</a:t>
+            </a:r>
+          </a:p>
+        </p:txBody>
+      </p:sp>
+      <p:pic>
+        <p:nvPicPr>
+          <p:cNvPr descr="Project_Quarto_R_files/figure-pptx/age-histogram2-1.png" id="0" name="Picture 1"/>
+          <p:cNvPicPr>
+            <a:picLocks noGrp="1" noChangeAspect="1"/>
+          </p:cNvPicPr>
+          <p:nvPr/>
+        </p:nvPicPr>
+        <p:blipFill>
+          <a:blip r:embed="rId2"/>
+          <a:stretch>
+            <a:fillRect/>
+          </a:stretch>
+        </p:blipFill>
+        <p:spPr bwMode="auto">
+          <a:xfrm>
+            <a:off x="3568700" y="1409700"/>
+            <a:ext cx="5092700" cy="2540000"/>
+          </a:xfrm>
+          <a:prstGeom prst="rect">
+            <a:avLst/>
+          </a:prstGeom>
+          <a:noFill/>
+          <a:ln w="9525">
+            <a:noFill/>
+            <a:headEnd/>
+            <a:tailEnd/>
+          </a:ln>
+        </p:spPr>
+      </p:pic>
     </p:spTree>
   </p:cSld>
 </p:sld>
@@ -4403,6 +4353,31 @@
       </p:grpSpPr>
       <p:sp>
         <p:nvSpPr>
+          <p:cNvPr id="2" name="Title 1"/>
+          <p:cNvSpPr>
+            <a:spLocks noGrp="1"/>
+          </p:cNvSpPr>
+          <p:nvPr>
+            <p:ph type="title"/>
+          </p:nvPr>
+        </p:nvSpPr>
+        <p:spPr/>
+        <p:txBody>
+          <a:bodyPr/>
+          <a:lstStyle/>
+          <a:p>
+            <a:pPr lvl="0" indent="0" marL="0">
+              <a:buNone/>
+            </a:pPr>
+            <a:r>
+              <a:rPr/>
+              <a:t>Summary stastistics</a:t>
+            </a:r>
+          </a:p>
+        </p:txBody>
+      </p:sp>
+      <p:sp>
+        <p:nvSpPr>
           <p:cNvPr id="3" name="Content Placeholder 2"/>
           <p:cNvSpPr>
             <a:spLocks noGrp="1"/>
@@ -4415,6 +4390,94 @@
         <p:txBody>
           <a:bodyPr/>
           <a:lstStyle/>
+          <a:p>
+            <a:pPr lvl="0" indent="0">
+              <a:buNone/>
+            </a:pPr>
+            <a:r>
+              <a:rPr>
+                <a:latin typeface="Courier"/>
+              </a:rPr>
+              <a:t>N: 76839</a:t>
+            </a:r>
+          </a:p>
+          <a:p>
+            <a:pPr lvl="0" indent="0">
+              <a:buNone/>
+            </a:pPr>
+            <a:r>
+              <a:rPr>
+                <a:latin typeface="Courier"/>
+              </a:rPr>
+              <a:t>Min: 2</a:t>
+            </a:r>
+          </a:p>
+          <a:p>
+            <a:pPr lvl="0" indent="0">
+              <a:buNone/>
+            </a:pPr>
+            <a:r>
+              <a:rPr>
+                <a:latin typeface="Courier"/>
+              </a:rPr>
+              <a:t>25th perc.: 27</a:t>
+            </a:r>
+          </a:p>
+          <a:p>
+            <a:pPr lvl="0" indent="0">
+              <a:buNone/>
+            </a:pPr>
+            <a:r>
+              <a:rPr>
+                <a:latin typeface="Courier"/>
+              </a:rPr>
+              <a:t>Mean: 39</a:t>
+            </a:r>
+          </a:p>
+          <a:p>
+            <a:pPr lvl="0" indent="0">
+              <a:buNone/>
+            </a:pPr>
+            <a:r>
+              <a:rPr>
+                <a:latin typeface="Courier"/>
+              </a:rPr>
+              <a:t>Median: 36</a:t>
+            </a:r>
+          </a:p>
+          <a:p>
+            <a:pPr lvl="0" indent="0">
+              <a:buNone/>
+            </a:pPr>
+            <a:r>
+              <a:rPr>
+                <a:latin typeface="Courier"/>
+              </a:rPr>
+              <a:t>SD: 15</a:t>
+            </a:r>
+          </a:p>
+          <a:p>
+            <a:pPr lvl="0" indent="0">
+              <a:buNone/>
+            </a:pPr>
+            <a:r>
+              <a:rPr>
+                <a:latin typeface="Courier"/>
+              </a:rPr>
+              <a:t>75th perc.: 49</a:t>
+            </a:r>
+          </a:p>
+          <a:p>
+            <a:pPr lvl="0" indent="0">
+              <a:buNone/>
+            </a:pPr>
+            <a:r>
+              <a:rPr>
+                <a:latin typeface="Courier"/>
+              </a:rPr>
+              <a:t>Max: 99</a:t>
+            </a:r>
+          </a:p>
           <a:p>
             <a:pPr lvl="0" indent="0" marL="0">
               <a:buNone/>
@@ -4425,17 +4488,14 @@
             </a:r>
             <a:r>
               <a:rPr/>
-              <a:t> The yougest victim was 2 years old, and the oldest 99 years old. Median victim age was 36 years.</a:t>
+              <a:t> The youngest victim was 2 years old, and the oldest 99 years old. Median victim age was 36 years.</a:t>
             </a:r>
           </a:p>
           <a:p>
             <a:pPr lvl="0" indent="0" marL="0">
-              <a:buNone/>
-            </a:pPr>
-            <a:br/>
-          </a:p>
-          <a:p>
-            <a:pPr lvl="0" indent="0" marL="0">
+              <a:spcBef>
+                <a:spcPts val="3000"/>
+              </a:spcBef>
               <a:buNone/>
             </a:pPr>
             <a:r>
@@ -4475,7 +4535,7 @@
             </a:r>
             <a:r>
               <a:rPr/>
-              <a:t> value in Shapiro-Wilk test is very low, confirming normal distribution of the data.</a:t>
+              <a:t> value in Shapiro-Wilk test is very low, confirming normal statistical distribution of the data.</a:t>
             </a:r>
           </a:p>
         </p:txBody>
@@ -4514,8 +4574,8 @@
         </p:nvSpPr>
         <p:spPr>
           <a:xfrm>
-            <a:off x="457201" y="204787"/>
-            <a:ext cx="3008313" cy="871538"/>
+            <a:off x="457200" y="204787"/>
+            <a:ext cx="8229599" cy="417170"/>
           </a:xfrm>
         </p:spPr>
         <p:txBody>
@@ -4527,7 +4587,7 @@
             </a:pPr>
             <a:r>
               <a:rPr/>
-              <a:t>5. Geographical distribution of crime</a:t>
+              <a:t>4. Geographical distribution of crime</a:t>
             </a:r>
           </a:p>
         </p:txBody>
@@ -4552,16 +4612,14 @@
             </a:pPr>
             <a:r>
               <a:rPr/>
-              <a:t>Certain offences usually exhibit a heterogeneous geographical distribution. To illustrate this, the map below displays the locations of reported cases of physical assault involving minors in 2024. Colors indicate victim sex.</a:t>
+              <a:t>Certain offences may exhibit a heterogeneous geographical distribution. To illustrate this, information on the geographical location of assaults on minors was extracted from the dataset, thereby yielding a smaller subset of data that can be clearly displayed on a map. Colors indicate victim sex.</a:t>
             </a:r>
           </a:p>
           <a:p>
             <a:pPr lvl="0" indent="0" marL="0">
-              <a:spcBef>
-                <a:spcPts val="3000"/>
-              </a:spcBef>
               <a:buNone/>
             </a:pPr>
+            <a:br/>
             <a:r>
               <a:rPr b="1"/>
               <a:t>Conclusion:</a:t>
@@ -4575,21 +4633,12 @@
               <a:rPr/>
               <a:t>The map clearly shows two large and two smaller clusters corresponding to areas where the majority of these offences (assaults on minors) occur, indicating where preventive measures in this regard should be intensified.</a:t>
             </a:r>
-          </a:p>
-          <a:p>
-            <a:pPr lvl="0" indent="0" marL="0">
-              <a:buNone/>
-            </a:pPr>
+            <a:br/>
+            <a:br/>
             <a:r>
               <a:rPr/>
               <a:t>No clear pattern is evident regarding the victims’ sex.</a:t>
             </a:r>
-          </a:p>
-          <a:p>
-            <a:pPr lvl="0" indent="0" marL="0">
-              <a:buNone/>
-            </a:pPr>
-            <a:br/>
           </a:p>
         </p:txBody>
       </p:sp>
@@ -4609,8 +4658,8 @@
         </p:blipFill>
         <p:spPr bwMode="auto">
           <a:xfrm>
-            <a:off x="3568700" y="1117600"/>
-            <a:ext cx="5105400" cy="2552700"/>
+            <a:off x="3568700" y="1409700"/>
+            <a:ext cx="5092700" cy="2540000"/>
           </a:xfrm>
           <a:prstGeom prst="rect">
             <a:avLst/>
@@ -4657,8 +4706,8 @@
         </p:nvSpPr>
         <p:spPr>
           <a:xfrm>
-            <a:off x="457201" y="204787"/>
-            <a:ext cx="3008313" cy="871538"/>
+            <a:off x="457200" y="204787"/>
+            <a:ext cx="8229599" cy="417170"/>
           </a:xfrm>
         </p:spPr>
         <p:txBody>
@@ -4670,7 +4719,7 @@
             </a:pPr>
             <a:r>
               <a:rPr/>
-              <a:t>6. Crime distribution by area</a:t>
+              <a:t>5. Areas most affected by crime</a:t>
             </a:r>
           </a:p>
         </p:txBody>
@@ -4695,16 +4744,14 @@
             </a:pPr>
             <a:r>
               <a:rPr/>
-              <a:t>The chart below shows crime distribution in the LA region by area. Five most common offences are presented.</a:t>
+              <a:t>This chart shows 10 areas with the highest crime rate. The diameters of the circles are proportional to the number of reported crimes in the respective areas. Exponential transformation was applied to better highlight the differences.</a:t>
             </a:r>
           </a:p>
           <a:p>
             <a:pPr lvl="0" indent="0" marL="0">
-              <a:spcBef>
-                <a:spcPts val="3000"/>
-              </a:spcBef>
               <a:buNone/>
             </a:pPr>
+            <a:br/>
             <a:r>
               <a:rPr b="1"/>
               <a:t>Conclusion:</a:t>
@@ -4716,14 +4763,20 @@
             </a:pPr>
             <a:r>
               <a:rPr/>
-              <a:t>For certain crimes there are marked differences in the number of reports depending on area. For instance, “BURGLARY FROM VEHICLE” occurred overwhelmingly in the “Central” area (with more than twice as many reports as in any other area). Other offences show more homogeneous distribution (e.g. “VANDALISM”).</a:t>
-            </a:r>
+              <a:t>Most reports are from the Central area, followed by Southwest and Pacific.</a:t>
+            </a:r>
+          </a:p>
+          <a:p>
+            <a:pPr lvl="0" indent="0" marL="0">
+              <a:buNone/>
+            </a:pPr>
+            <a:br/>
           </a:p>
         </p:txBody>
       </p:sp>
       <p:pic>
         <p:nvPicPr>
-          <p:cNvPr descr="Project_Quarto_R_files/figure-pptx/plot-area-1.png" id="0" name="Picture 1"/>
+          <p:cNvPr descr="Project_Quarto_R_files/figure-pptx/plot-affected-areas-1.png" id="0" name="Picture 1"/>
           <p:cNvPicPr>
             <a:picLocks noGrp="1" noChangeAspect="1"/>
           </p:cNvPicPr>
@@ -4737,8 +4790,8 @@
         </p:blipFill>
         <p:spPr bwMode="auto">
           <a:xfrm>
-            <a:off x="3937000" y="203200"/>
-            <a:ext cx="4381500" cy="4381500"/>
+            <a:off x="4216400" y="787400"/>
+            <a:ext cx="3797300" cy="3797300"/>
           </a:xfrm>
           <a:prstGeom prst="rect">
             <a:avLst/>

</xml_diff>